<commit_message>
added note about Discord
</commit_message>
<xml_diff>
--- a/Build-On.pptx
+++ b/Build-On.pptx
@@ -5,9 +5,16 @@
     <p:sldMasterId id="2147483648" r:id="rId1"/>
   </p:sldMasterIdLst>
   <p:sldIdLst>
-    <p:sldId id="256" r:id="rId2"/>
-    <p:sldId id="257" r:id="rId3"/>
-    <p:sldId id="258" r:id="rId4"/>
+    <p:sldId id="264" r:id="rId2"/>
+    <p:sldId id="256" r:id="rId3"/>
+    <p:sldId id="257" r:id="rId4"/>
+    <p:sldId id="265" r:id="rId5"/>
+    <p:sldId id="258" r:id="rId6"/>
+    <p:sldId id="259" r:id="rId7"/>
+    <p:sldId id="260" r:id="rId8"/>
+    <p:sldId id="261" r:id="rId9"/>
+    <p:sldId id="262" r:id="rId10"/>
+    <p:sldId id="263" r:id="rId11"/>
   </p:sldIdLst>
   <p:sldSz cx="12192000" cy="6858000"/>
   <p:notesSz cx="6858000" cy="9144000"/>
@@ -261,7 +268,7 @@
           <a:p>
             <a:fld id="{62A8A12F-4B01-424F-AD07-F42ED760B84B}" type="datetimeFigureOut">
               <a:rPr lang="en-US" smtClean="0"/>
-              <a:t>10/11/2020</a:t>
+              <a:t>2/10/2021</a:t>
             </a:fld>
             <a:endParaRPr lang="en-US"/>
           </a:p>
@@ -459,7 +466,7 @@
           <a:p>
             <a:fld id="{62A8A12F-4B01-424F-AD07-F42ED760B84B}" type="datetimeFigureOut">
               <a:rPr lang="en-US" smtClean="0"/>
-              <a:t>10/11/2020</a:t>
+              <a:t>2/10/2021</a:t>
             </a:fld>
             <a:endParaRPr lang="en-US"/>
           </a:p>
@@ -667,7 +674,7 @@
           <a:p>
             <a:fld id="{62A8A12F-4B01-424F-AD07-F42ED760B84B}" type="datetimeFigureOut">
               <a:rPr lang="en-US" smtClean="0"/>
-              <a:t>10/11/2020</a:t>
+              <a:t>2/10/2021</a:t>
             </a:fld>
             <a:endParaRPr lang="en-US"/>
           </a:p>
@@ -865,7 +872,7 @@
           <a:p>
             <a:fld id="{62A8A12F-4B01-424F-AD07-F42ED760B84B}" type="datetimeFigureOut">
               <a:rPr lang="en-US" smtClean="0"/>
-              <a:t>10/11/2020</a:t>
+              <a:t>2/10/2021</a:t>
             </a:fld>
             <a:endParaRPr lang="en-US"/>
           </a:p>
@@ -1140,7 +1147,7 @@
           <a:p>
             <a:fld id="{62A8A12F-4B01-424F-AD07-F42ED760B84B}" type="datetimeFigureOut">
               <a:rPr lang="en-US" smtClean="0"/>
-              <a:t>10/11/2020</a:t>
+              <a:t>2/10/2021</a:t>
             </a:fld>
             <a:endParaRPr lang="en-US"/>
           </a:p>
@@ -1405,7 +1412,7 @@
           <a:p>
             <a:fld id="{62A8A12F-4B01-424F-AD07-F42ED760B84B}" type="datetimeFigureOut">
               <a:rPr lang="en-US" smtClean="0"/>
-              <a:t>10/11/2020</a:t>
+              <a:t>2/10/2021</a:t>
             </a:fld>
             <a:endParaRPr lang="en-US"/>
           </a:p>
@@ -1817,7 +1824,7 @@
           <a:p>
             <a:fld id="{62A8A12F-4B01-424F-AD07-F42ED760B84B}" type="datetimeFigureOut">
               <a:rPr lang="en-US" smtClean="0"/>
-              <a:t>10/11/2020</a:t>
+              <a:t>2/10/2021</a:t>
             </a:fld>
             <a:endParaRPr lang="en-US"/>
           </a:p>
@@ -1958,7 +1965,7 @@
           <a:p>
             <a:fld id="{62A8A12F-4B01-424F-AD07-F42ED760B84B}" type="datetimeFigureOut">
               <a:rPr lang="en-US" smtClean="0"/>
-              <a:t>10/11/2020</a:t>
+              <a:t>2/10/2021</a:t>
             </a:fld>
             <a:endParaRPr lang="en-US"/>
           </a:p>
@@ -2071,7 +2078,7 @@
           <a:p>
             <a:fld id="{62A8A12F-4B01-424F-AD07-F42ED760B84B}" type="datetimeFigureOut">
               <a:rPr lang="en-US" smtClean="0"/>
-              <a:t>10/11/2020</a:t>
+              <a:t>2/10/2021</a:t>
             </a:fld>
             <a:endParaRPr lang="en-US"/>
           </a:p>
@@ -2382,7 +2389,7 @@
           <a:p>
             <a:fld id="{62A8A12F-4B01-424F-AD07-F42ED760B84B}" type="datetimeFigureOut">
               <a:rPr lang="en-US" smtClean="0"/>
-              <a:t>10/11/2020</a:t>
+              <a:t>2/10/2021</a:t>
             </a:fld>
             <a:endParaRPr lang="en-US"/>
           </a:p>
@@ -2670,7 +2677,7 @@
           <a:p>
             <a:fld id="{62A8A12F-4B01-424F-AD07-F42ED760B84B}" type="datetimeFigureOut">
               <a:rPr lang="en-US" smtClean="0"/>
-              <a:t>10/11/2020</a:t>
+              <a:t>2/10/2021</a:t>
             </a:fld>
             <a:endParaRPr lang="en-US"/>
           </a:p>
@@ -2911,7 +2918,7 @@
           <a:p>
             <a:fld id="{62A8A12F-4B01-424F-AD07-F42ED760B84B}" type="datetimeFigureOut">
               <a:rPr lang="en-US" smtClean="0"/>
-              <a:t>10/11/2020</a:t>
+              <a:t>2/10/2021</a:t>
             </a:fld>
             <a:endParaRPr lang="en-US"/>
           </a:p>
@@ -3330,10 +3337,10 @@
       </p:grpSpPr>
       <p:sp>
         <p:nvSpPr>
-          <p:cNvPr id="2" name="Title 1">
-            <a:extLst>
-              <a:ext uri="{FF2B5EF4-FFF2-40B4-BE49-F238E27FC236}">
-                <a16:creationId xmlns:a16="http://schemas.microsoft.com/office/drawing/2014/main" id="{07781AE0-3723-46E6-8CBD-2ABF958F5379}"/>
+          <p:cNvPr id="4" name="Title 3">
+            <a:extLst>
+              <a:ext uri="{FF2B5EF4-FFF2-40B4-BE49-F238E27FC236}">
+                <a16:creationId xmlns:a16="http://schemas.microsoft.com/office/drawing/2014/main" id="{78581FE1-6FD2-47AA-BC70-5D1194D1328C}"/>
               </a:ext>
             </a:extLst>
           </p:cNvPr>
@@ -3346,10 +3353,193 @@
         </p:nvSpPr>
         <p:spPr>
           <a:xfrm>
-            <a:off x="1524000" y="915194"/>
+            <a:off x="1524000" y="1122363"/>
+            <a:ext cx="9144000" cy="2133599"/>
+          </a:xfrm>
+        </p:spPr>
+        <p:txBody>
+          <a:bodyPr/>
+          <a:lstStyle/>
+          <a:p>
+            <a:r>
+              <a:rPr lang="en-US" dirty="0"/>
+              <a:t>Rust </a:t>
+            </a:r>
+            <a:r>
+              <a:rPr lang="en-US" dirty="0" err="1"/>
+              <a:t>BuildOn</a:t>
+            </a:r>
+            <a:endParaRPr lang="en-US" dirty="0"/>
+          </a:p>
+        </p:txBody>
+      </p:sp>
+      <p:sp>
+        <p:nvSpPr>
+          <p:cNvPr id="5" name="Subtitle 4">
+            <a:extLst>
+              <a:ext uri="{FF2B5EF4-FFF2-40B4-BE49-F238E27FC236}">
+                <a16:creationId xmlns:a16="http://schemas.microsoft.com/office/drawing/2014/main" id="{AAAE2BE9-57A0-494A-9FF3-AB1AF25CBEAC}"/>
+              </a:ext>
+            </a:extLst>
+          </p:cNvPr>
+          <p:cNvSpPr>
+            <a:spLocks noGrp="1"/>
+          </p:cNvSpPr>
+          <p:nvPr>
+            <p:ph type="subTitle" idx="1"/>
+          </p:nvPr>
+        </p:nvSpPr>
+        <p:spPr/>
+        <p:txBody>
+          <a:bodyPr/>
+          <a:lstStyle/>
+          <a:p>
+            <a:r>
+              <a:rPr lang="en-US" dirty="0"/>
+              <a:t>Jim Fawcett</a:t>
+            </a:r>
+          </a:p>
+          <a:p>
+            <a:r>
+              <a:rPr lang="en-US" dirty="0">
+                <a:hlinkClick r:id="rId2"/>
+              </a:rPr>
+              <a:t>https://JimFawcett.github.io</a:t>
+            </a:r>
+            <a:endParaRPr lang="en-US" dirty="0"/>
+          </a:p>
+          <a:p>
+            <a:r>
+              <a:rPr lang="en-US" dirty="0"/>
+              <a:t>February 9, 2021</a:t>
+            </a:r>
+          </a:p>
+        </p:txBody>
+      </p:sp>
+    </p:spTree>
+    <p:extLst>
+      <p:ext uri="{BB962C8B-B14F-4D97-AF65-F5344CB8AC3E}">
+        <p14:creationId xmlns:p14="http://schemas.microsoft.com/office/powerpoint/2010/main" val="1618792912"/>
+      </p:ext>
+    </p:extLst>
+  </p:cSld>
+  <p:clrMapOvr>
+    <a:masterClrMapping/>
+  </p:clrMapOvr>
+</p:sld>
+</file>
+
+<file path=ppt/slides/slide10.xml><?xml version="1.0" encoding="utf-8"?>
+<p:sld xmlns:a="http://schemas.openxmlformats.org/drawingml/2006/main" xmlns:r="http://schemas.openxmlformats.org/officeDocument/2006/relationships" xmlns:p="http://schemas.openxmlformats.org/presentationml/2006/main">
+  <p:cSld>
+    <p:spTree>
+      <p:nvGrpSpPr>
+        <p:cNvPr id="1" name=""/>
+        <p:cNvGrpSpPr/>
+        <p:nvPr/>
+      </p:nvGrpSpPr>
+      <p:grpSpPr>
+        <a:xfrm>
+          <a:off x="0" y="0"/>
+          <a:ext cx="0" cy="0"/>
+          <a:chOff x="0" y="0"/>
+          <a:chExt cx="0" cy="0"/>
+        </a:xfrm>
+      </p:grpSpPr>
+      <p:sp>
+        <p:nvSpPr>
+          <p:cNvPr id="4" name="Title 3">
+            <a:extLst>
+              <a:ext uri="{FF2B5EF4-FFF2-40B4-BE49-F238E27FC236}">
+                <a16:creationId xmlns:a16="http://schemas.microsoft.com/office/drawing/2014/main" id="{E21D365E-E47D-40C4-B27C-EB8ECB058426}"/>
+              </a:ext>
+            </a:extLst>
+          </p:cNvPr>
+          <p:cNvSpPr>
+            <a:spLocks noGrp="1"/>
+          </p:cNvSpPr>
+          <p:nvPr>
+            <p:ph type="title"/>
+          </p:nvPr>
+        </p:nvSpPr>
+        <p:spPr/>
+        <p:txBody>
+          <a:bodyPr/>
+          <a:lstStyle/>
+          <a:p>
+            <a:r>
+              <a:rPr lang="en-US" dirty="0"/>
+              <a:t>That’s All Folks!</a:t>
+            </a:r>
+          </a:p>
+        </p:txBody>
+      </p:sp>
+    </p:spTree>
+    <p:extLst>
+      <p:ext uri="{BB962C8B-B14F-4D97-AF65-F5344CB8AC3E}">
+        <p14:creationId xmlns:p14="http://schemas.microsoft.com/office/powerpoint/2010/main" val="702867322"/>
+      </p:ext>
+    </p:extLst>
+  </p:cSld>
+  <p:clrMapOvr>
+    <a:masterClrMapping/>
+  </p:clrMapOvr>
+</p:sld>
+</file>
+
+<file path=ppt/slides/slide2.xml><?xml version="1.0" encoding="utf-8"?>
+<p:sld xmlns:a="http://schemas.openxmlformats.org/drawingml/2006/main" xmlns:r="http://schemas.openxmlformats.org/officeDocument/2006/relationships" xmlns:p="http://schemas.openxmlformats.org/presentationml/2006/main">
+  <p:cSld>
+    <p:spTree>
+      <p:nvGrpSpPr>
+        <p:cNvPr id="1" name=""/>
+        <p:cNvGrpSpPr/>
+        <p:nvPr/>
+      </p:nvGrpSpPr>
+      <p:grpSpPr>
+        <a:xfrm>
+          <a:off x="0" y="0"/>
+          <a:ext cx="0" cy="0"/>
+          <a:chOff x="0" y="0"/>
+          <a:chExt cx="0" cy="0"/>
+        </a:xfrm>
+      </p:grpSpPr>
+      <p:sp>
+        <p:nvSpPr>
+          <p:cNvPr id="2" name="Title 1">
+            <a:extLst>
+              <a:ext uri="{FF2B5EF4-FFF2-40B4-BE49-F238E27FC236}">
+                <a16:creationId xmlns:a16="http://schemas.microsoft.com/office/drawing/2014/main" id="{07781AE0-3723-46E6-8CBD-2ABF958F5379}"/>
+              </a:ext>
+            </a:extLst>
+          </p:cNvPr>
+          <p:cNvSpPr>
+            <a:spLocks noGrp="1"/>
+          </p:cNvSpPr>
+          <p:nvPr>
+            <p:ph type="ctrTitle"/>
+          </p:nvPr>
+        </p:nvSpPr>
+        <p:spPr>
+          <a:xfrm>
+            <a:off x="1524000" y="450851"/>
             <a:ext cx="9144000" cy="927893"/>
           </a:xfrm>
         </p:spPr>
+        <p:style>
+          <a:lnRef idx="2">
+            <a:schemeClr val="accent3"/>
+          </a:lnRef>
+          <a:fillRef idx="1">
+            <a:schemeClr val="lt1"/>
+          </a:fillRef>
+          <a:effectRef idx="0">
+            <a:schemeClr val="accent3"/>
+          </a:effectRef>
+          <a:fontRef idx="minor">
+            <a:schemeClr val="dk1"/>
+          </a:fontRef>
+        </p:style>
         <p:txBody>
           <a:bodyPr/>
           <a:lstStyle/>
@@ -3379,8 +3569,8 @@
         </p:nvSpPr>
         <p:spPr>
           <a:xfrm>
-            <a:off x="1524000" y="1985963"/>
-            <a:ext cx="9144000" cy="3493293"/>
+            <a:off x="1524000" y="1535907"/>
+            <a:ext cx="9144000" cy="4257674"/>
           </a:xfrm>
         </p:spPr>
         <p:txBody>
@@ -3410,7 +3600,17 @@
             </a:pPr>
             <a:r>
               <a:rPr lang="en-US" dirty="0"/>
-              <a:t>Text finder</a:t>
+              <a:t>Text Finder</a:t>
+            </a:r>
+          </a:p>
+          <a:p>
+            <a:pPr marL="342900" indent="-342900" algn="l">
+              <a:buFont typeface="Arial" panose="020B0604020202020204" pitchFamily="34" charset="0"/>
+              <a:buChar char="•"/>
+            </a:pPr>
+            <a:r>
+              <a:rPr lang="en-US" dirty="0"/>
+              <a:t>Build on that in interesting ways, e.g., for Text Finder:</a:t>
             </a:r>
           </a:p>
           <a:p>
@@ -3419,10 +3619,47 @@
               <a:buChar char="•"/>
             </a:pPr>
             <a:r>
+              <a:rPr lang="en-US" dirty="0"/>
+              <a:t>Add capability – command line parsing, directory tree walking, …</a:t>
+            </a:r>
+          </a:p>
+          <a:p>
+            <a:pPr marL="800100" lvl="1" indent="-342900" algn="l">
+              <a:buFont typeface="Arial" panose="020B0604020202020204" pitchFamily="34" charset="0"/>
+              <a:buChar char="•"/>
+            </a:pPr>
+            <a:r>
+              <a:rPr lang="en-US" dirty="0"/>
+              <a:t>Use generics – plugin components</a:t>
+            </a:r>
+          </a:p>
+          <a:p>
+            <a:pPr marL="800100" lvl="1" indent="-342900" algn="l">
+              <a:buFont typeface="Arial" panose="020B0604020202020204" pitchFamily="34" charset="0"/>
+              <a:buChar char="•"/>
+            </a:pPr>
+            <a:r>
+              <a:rPr lang="en-US" dirty="0"/>
+              <a:t>Use threads – parallel text searches, thread pool based </a:t>
+            </a:r>
+            <a:r>
               <a:rPr lang="en-US" dirty="0" err="1"/>
-              <a:t>Lexer</a:t>
-            </a:r>
-            <a:endParaRPr lang="en-US" dirty="0"/>
+              <a:t>dir</a:t>
+            </a:r>
+            <a:r>
+              <a:rPr lang="en-US" dirty="0"/>
+              <a:t> traversal</a:t>
+            </a:r>
+          </a:p>
+          <a:p>
+            <a:pPr marL="800100" lvl="1" indent="-342900" algn="l">
+              <a:buFont typeface="Arial" panose="020B0604020202020204" pitchFamily="34" charset="0"/>
+              <a:buChar char="•"/>
+            </a:pPr>
+            <a:r>
+              <a:rPr lang="en-US" dirty="0"/>
+              <a:t>Use library components</a:t>
+            </a:r>
           </a:p>
           <a:p>
             <a:pPr marL="342900" indent="-342900" algn="l">
@@ -3431,7 +3668,7 @@
             </a:pPr>
             <a:r>
               <a:rPr lang="en-US" dirty="0"/>
-              <a:t>Build on that in interesting ways</a:t>
+              <a:t>Discord server</a:t>
             </a:r>
           </a:p>
           <a:p>
@@ -3441,7 +3678,7 @@
             </a:pPr>
             <a:r>
               <a:rPr lang="en-US" dirty="0"/>
-              <a:t>Add capability – command line parsing, directory tree walking, …</a:t>
+              <a:t>Q&amp;A</a:t>
             </a:r>
           </a:p>
           <a:p>
@@ -3451,35 +3688,7 @@
             </a:pPr>
             <a:r>
               <a:rPr lang="en-US" dirty="0"/>
-              <a:t>Use generics – plugin components</a:t>
-            </a:r>
-          </a:p>
-          <a:p>
-            <a:pPr marL="800100" lvl="1" indent="-342900" algn="l">
-              <a:buFont typeface="Arial" panose="020B0604020202020204" pitchFamily="34" charset="0"/>
-              <a:buChar char="•"/>
-            </a:pPr>
-            <a:r>
-              <a:rPr lang="en-US" dirty="0"/>
-              <a:t>Use threads – parallel text searches, thread pool based </a:t>
-            </a:r>
-            <a:r>
-              <a:rPr lang="en-US" dirty="0" err="1"/>
-              <a:t>dir</a:t>
-            </a:r>
-            <a:r>
-              <a:rPr lang="en-US" dirty="0"/>
-              <a:t> traversal</a:t>
-            </a:r>
-          </a:p>
-          <a:p>
-            <a:pPr marL="800100" lvl="1" indent="-342900" algn="l">
-              <a:buFont typeface="Arial" panose="020B0604020202020204" pitchFamily="34" charset="0"/>
-              <a:buChar char="•"/>
-            </a:pPr>
-            <a:r>
-              <a:rPr lang="en-US" dirty="0"/>
-              <a:t>Use library components</a:t>
+              <a:t>Comments</a:t>
             </a:r>
           </a:p>
           <a:p>
@@ -3553,158 +3762,6 @@
 </p:sld>
 </file>
 
-<file path=ppt/slides/slide2.xml><?xml version="1.0" encoding="utf-8"?>
-<p:sld xmlns:a="http://schemas.openxmlformats.org/drawingml/2006/main" xmlns:r="http://schemas.openxmlformats.org/officeDocument/2006/relationships" xmlns:p="http://schemas.openxmlformats.org/presentationml/2006/main">
-  <p:cSld>
-    <p:spTree>
-      <p:nvGrpSpPr>
-        <p:cNvPr id="1" name=""/>
-        <p:cNvGrpSpPr/>
-        <p:nvPr/>
-      </p:nvGrpSpPr>
-      <p:grpSpPr>
-        <a:xfrm>
-          <a:off x="0" y="0"/>
-          <a:ext cx="0" cy="0"/>
-          <a:chOff x="0" y="0"/>
-          <a:chExt cx="0" cy="0"/>
-        </a:xfrm>
-      </p:grpSpPr>
-      <p:sp>
-        <p:nvSpPr>
-          <p:cNvPr id="2" name="Title 1">
-            <a:extLst>
-              <a:ext uri="{FF2B5EF4-FFF2-40B4-BE49-F238E27FC236}">
-                <a16:creationId xmlns:a16="http://schemas.microsoft.com/office/drawing/2014/main" id="{3B51CB06-20F9-4D5D-9E36-87C19142DB53}"/>
-              </a:ext>
-            </a:extLst>
-          </p:cNvPr>
-          <p:cNvSpPr>
-            <a:spLocks noGrp="1"/>
-          </p:cNvSpPr>
-          <p:nvPr>
-            <p:ph type="title"/>
-          </p:nvPr>
-        </p:nvSpPr>
-        <p:spPr/>
-        <p:txBody>
-          <a:bodyPr/>
-          <a:lstStyle/>
-          <a:p>
-            <a:r>
-              <a:rPr lang="en-US" dirty="0"/>
-              <a:t>Build-On Process</a:t>
-            </a:r>
-          </a:p>
-        </p:txBody>
-      </p:sp>
-      <p:sp>
-        <p:nvSpPr>
-          <p:cNvPr id="3" name="Content Placeholder 2">
-            <a:extLst>
-              <a:ext uri="{FF2B5EF4-FFF2-40B4-BE49-F238E27FC236}">
-                <a16:creationId xmlns:a16="http://schemas.microsoft.com/office/drawing/2014/main" id="{62CE037D-55B8-4B3B-A046-34952BCB0114}"/>
-              </a:ext>
-            </a:extLst>
-          </p:cNvPr>
-          <p:cNvSpPr>
-            <a:spLocks noGrp="1"/>
-          </p:cNvSpPr>
-          <p:nvPr>
-            <p:ph idx="1"/>
-          </p:nvPr>
-        </p:nvSpPr>
-        <p:spPr/>
-        <p:txBody>
-          <a:bodyPr/>
-          <a:lstStyle/>
-          <a:p>
-            <a:r>
-              <a:rPr lang="en-US" dirty="0"/>
-              <a:t>Zoom meeting that:</a:t>
-            </a:r>
-          </a:p>
-          <a:p>
-            <a:pPr lvl="1"/>
-            <a:r>
-              <a:rPr lang="en-US" dirty="0"/>
-              <a:t>Briefly describes motives for using Rust and Rust basic ideas</a:t>
-            </a:r>
-          </a:p>
-          <a:p>
-            <a:pPr lvl="1"/>
-            <a:r>
-              <a:rPr lang="en-US" dirty="0"/>
-              <a:t>Provides two or three references</a:t>
-            </a:r>
-          </a:p>
-          <a:p>
-            <a:pPr lvl="1"/>
-            <a:r>
-              <a:rPr lang="en-US" dirty="0"/>
-              <a:t>identifies a problem and refers to starter code</a:t>
-            </a:r>
-          </a:p>
-          <a:p>
-            <a:pPr lvl="1"/>
-            <a:r>
-              <a:rPr lang="en-US" dirty="0"/>
-              <a:t>Q&amp;A</a:t>
-            </a:r>
-          </a:p>
-          <a:p>
-            <a:r>
-              <a:rPr lang="en-US" dirty="0"/>
-              <a:t>Subsequent meetings </a:t>
-            </a:r>
-          </a:p>
-          <a:p>
-            <a:pPr lvl="1"/>
-            <a:r>
-              <a:rPr lang="en-US" dirty="0"/>
-              <a:t>Briefly describes my solution</a:t>
-            </a:r>
-          </a:p>
-          <a:p>
-            <a:pPr lvl="1"/>
-            <a:r>
-              <a:rPr lang="en-US" dirty="0"/>
-              <a:t>Others may discuss their solutions and/or problems</a:t>
-            </a:r>
-          </a:p>
-          <a:p>
-            <a:pPr lvl="1"/>
-            <a:r>
-              <a:rPr lang="en-US" dirty="0"/>
-              <a:t>Pose next extension </a:t>
-            </a:r>
-            <a:r>
-              <a:rPr lang="en-US"/>
-              <a:t>to problem</a:t>
-            </a:r>
-          </a:p>
-          <a:p>
-            <a:pPr lvl="1"/>
-            <a:r>
-              <a:rPr lang="en-US" dirty="0"/>
-              <a:t>Q&amp;A</a:t>
-            </a:r>
-          </a:p>
-        </p:txBody>
-      </p:sp>
-    </p:spTree>
-    <p:extLst>
-      <p:ext uri="{BB962C8B-B14F-4D97-AF65-F5344CB8AC3E}">
-        <p14:creationId xmlns:p14="http://schemas.microsoft.com/office/powerpoint/2010/main" val="288098898"/>
-      </p:ext>
-    </p:extLst>
-  </p:cSld>
-  <p:clrMapOvr>
-    <a:masterClrMapping/>
-  </p:clrMapOvr>
-</p:sld>
-</file>
-
 <file path=ppt/slides/slide3.xml><?xml version="1.0" encoding="utf-8"?>
 <p:sld xmlns:a="http://schemas.openxmlformats.org/drawingml/2006/main" xmlns:r="http://schemas.openxmlformats.org/officeDocument/2006/relationships" xmlns:p="http://schemas.openxmlformats.org/presentationml/2006/main">
   <p:cSld>
@@ -3727,6 +3784,400 @@
           <p:cNvPr id="2" name="Title 1">
             <a:extLst>
               <a:ext uri="{FF2B5EF4-FFF2-40B4-BE49-F238E27FC236}">
+                <a16:creationId xmlns:a16="http://schemas.microsoft.com/office/drawing/2014/main" id="{3B51CB06-20F9-4D5D-9E36-87C19142DB53}"/>
+              </a:ext>
+            </a:extLst>
+          </p:cNvPr>
+          <p:cNvSpPr>
+            <a:spLocks noGrp="1"/>
+          </p:cNvSpPr>
+          <p:nvPr>
+            <p:ph type="title"/>
+          </p:nvPr>
+        </p:nvSpPr>
+        <p:spPr/>
+        <p:style>
+          <a:lnRef idx="2">
+            <a:schemeClr val="accent3"/>
+          </a:lnRef>
+          <a:fillRef idx="1">
+            <a:schemeClr val="lt1"/>
+          </a:fillRef>
+          <a:effectRef idx="0">
+            <a:schemeClr val="accent3"/>
+          </a:effectRef>
+          <a:fontRef idx="minor">
+            <a:schemeClr val="dk1"/>
+          </a:fontRef>
+        </p:style>
+        <p:txBody>
+          <a:bodyPr/>
+          <a:lstStyle/>
+          <a:p>
+            <a:r>
+              <a:rPr lang="en-US" dirty="0"/>
+              <a:t>Build-On Process</a:t>
+            </a:r>
+          </a:p>
+        </p:txBody>
+      </p:sp>
+      <p:sp>
+        <p:nvSpPr>
+          <p:cNvPr id="3" name="Content Placeholder 2">
+            <a:extLst>
+              <a:ext uri="{FF2B5EF4-FFF2-40B4-BE49-F238E27FC236}">
+                <a16:creationId xmlns:a16="http://schemas.microsoft.com/office/drawing/2014/main" id="{62CE037D-55B8-4B3B-A046-34952BCB0114}"/>
+              </a:ext>
+            </a:extLst>
+          </p:cNvPr>
+          <p:cNvSpPr>
+            <a:spLocks noGrp="1"/>
+          </p:cNvSpPr>
+          <p:nvPr>
+            <p:ph idx="1"/>
+          </p:nvPr>
+        </p:nvSpPr>
+        <p:spPr/>
+        <p:txBody>
+          <a:bodyPr/>
+          <a:lstStyle/>
+          <a:p>
+            <a:r>
+              <a:rPr lang="en-US" dirty="0"/>
+              <a:t>Zoom meeting that:</a:t>
+            </a:r>
+          </a:p>
+          <a:p>
+            <a:pPr lvl="1"/>
+            <a:r>
+              <a:rPr lang="en-US" dirty="0"/>
+              <a:t>Briefly describes motives for using Rust and Rust basic ideas</a:t>
+            </a:r>
+          </a:p>
+          <a:p>
+            <a:pPr lvl="1"/>
+            <a:r>
+              <a:rPr lang="en-US" dirty="0"/>
+              <a:t>Provides two or three references</a:t>
+            </a:r>
+          </a:p>
+          <a:p>
+            <a:pPr lvl="1"/>
+            <a:r>
+              <a:rPr lang="en-US" dirty="0"/>
+              <a:t>identifies a problem and refers to starter code</a:t>
+            </a:r>
+          </a:p>
+          <a:p>
+            <a:pPr lvl="1"/>
+            <a:r>
+              <a:rPr lang="en-US" dirty="0"/>
+              <a:t>Q&amp;A</a:t>
+            </a:r>
+          </a:p>
+          <a:p>
+            <a:r>
+              <a:rPr lang="en-US" dirty="0"/>
+              <a:t>Subsequent meetings </a:t>
+            </a:r>
+          </a:p>
+          <a:p>
+            <a:pPr lvl="1"/>
+            <a:r>
+              <a:rPr lang="en-US" dirty="0"/>
+              <a:t>Briefly describes my solution</a:t>
+            </a:r>
+          </a:p>
+          <a:p>
+            <a:pPr lvl="1"/>
+            <a:r>
+              <a:rPr lang="en-US" dirty="0"/>
+              <a:t>Others may discuss their solutions and/or problems</a:t>
+            </a:r>
+          </a:p>
+          <a:p>
+            <a:pPr lvl="1"/>
+            <a:r>
+              <a:rPr lang="en-US" dirty="0"/>
+              <a:t>Pose next extension </a:t>
+            </a:r>
+            <a:r>
+              <a:rPr lang="en-US"/>
+              <a:t>to problem</a:t>
+            </a:r>
+          </a:p>
+          <a:p>
+            <a:pPr lvl="1"/>
+            <a:r>
+              <a:rPr lang="en-US" dirty="0"/>
+              <a:t>Q&amp;A</a:t>
+            </a:r>
+          </a:p>
+        </p:txBody>
+      </p:sp>
+    </p:spTree>
+    <p:extLst>
+      <p:ext uri="{BB962C8B-B14F-4D97-AF65-F5344CB8AC3E}">
+        <p14:creationId xmlns:p14="http://schemas.microsoft.com/office/powerpoint/2010/main" val="288098898"/>
+      </p:ext>
+    </p:extLst>
+  </p:cSld>
+  <p:clrMapOvr>
+    <a:masterClrMapping/>
+  </p:clrMapOvr>
+</p:sld>
+</file>
+
+<file path=ppt/slides/slide4.xml><?xml version="1.0" encoding="utf-8"?>
+<p:sld xmlns:a="http://schemas.openxmlformats.org/drawingml/2006/main" xmlns:r="http://schemas.openxmlformats.org/officeDocument/2006/relationships" xmlns:p="http://schemas.openxmlformats.org/presentationml/2006/main">
+  <p:cSld>
+    <p:spTree>
+      <p:nvGrpSpPr>
+        <p:cNvPr id="1" name=""/>
+        <p:cNvGrpSpPr/>
+        <p:nvPr/>
+      </p:nvGrpSpPr>
+      <p:grpSpPr>
+        <a:xfrm>
+          <a:off x="0" y="0"/>
+          <a:ext cx="0" cy="0"/>
+          <a:chOff x="0" y="0"/>
+          <a:chExt cx="0" cy="0"/>
+        </a:xfrm>
+      </p:grpSpPr>
+      <p:sp>
+        <p:nvSpPr>
+          <p:cNvPr id="2" name="Title 1">
+            <a:extLst>
+              <a:ext uri="{FF2B5EF4-FFF2-40B4-BE49-F238E27FC236}">
+                <a16:creationId xmlns:a16="http://schemas.microsoft.com/office/drawing/2014/main" id="{A2E65555-F22A-48E4-8CE9-EEAC9D4F4CF3}"/>
+              </a:ext>
+            </a:extLst>
+          </p:cNvPr>
+          <p:cNvSpPr>
+            <a:spLocks noGrp="1"/>
+          </p:cNvSpPr>
+          <p:nvPr>
+            <p:ph type="title"/>
+          </p:nvPr>
+        </p:nvSpPr>
+        <p:spPr>
+          <a:ln/>
+        </p:spPr>
+        <p:style>
+          <a:lnRef idx="2">
+            <a:schemeClr val="accent3"/>
+          </a:lnRef>
+          <a:fillRef idx="1">
+            <a:schemeClr val="lt1"/>
+          </a:fillRef>
+          <a:effectRef idx="0">
+            <a:schemeClr val="accent3"/>
+          </a:effectRef>
+          <a:fontRef idx="minor">
+            <a:schemeClr val="dk1"/>
+          </a:fontRef>
+        </p:style>
+        <p:txBody>
+          <a:bodyPr/>
+          <a:lstStyle/>
+          <a:p>
+            <a:r>
+              <a:rPr lang="en-US" dirty="0" err="1"/>
+              <a:t>BuildOn</a:t>
+            </a:r>
+            <a:r>
+              <a:rPr lang="en-US" dirty="0"/>
+              <a:t> Timeline: Bi-Weekly Sessions</a:t>
+            </a:r>
+          </a:p>
+        </p:txBody>
+      </p:sp>
+      <p:sp>
+        <p:nvSpPr>
+          <p:cNvPr id="3" name="Content Placeholder 2">
+            <a:extLst>
+              <a:ext uri="{FF2B5EF4-FFF2-40B4-BE49-F238E27FC236}">
+                <a16:creationId xmlns:a16="http://schemas.microsoft.com/office/drawing/2014/main" id="{4E60D2C1-9BE4-4493-9013-699EB16EB351}"/>
+              </a:ext>
+            </a:extLst>
+          </p:cNvPr>
+          <p:cNvSpPr>
+            <a:spLocks noGrp="1"/>
+          </p:cNvSpPr>
+          <p:nvPr>
+            <p:ph idx="1"/>
+          </p:nvPr>
+        </p:nvSpPr>
+        <p:spPr/>
+        <p:txBody>
+          <a:bodyPr/>
+          <a:lstStyle/>
+          <a:p>
+            <a:r>
+              <a:rPr lang="en-US" dirty="0"/>
+              <a:t>Session #1 – </a:t>
+            </a:r>
+            <a:r>
+              <a:rPr lang="en-US" dirty="0" err="1"/>
+              <a:t>BuildOn</a:t>
+            </a:r>
+            <a:r>
+              <a:rPr lang="en-US" dirty="0"/>
+              <a:t> Introduction &amp; Rust Preview</a:t>
+            </a:r>
+          </a:p>
+          <a:p>
+            <a:r>
+              <a:rPr lang="en-US" dirty="0"/>
+              <a:t>Session #2 – Project Introduction &amp; Some Rust details</a:t>
+            </a:r>
+          </a:p>
+          <a:p>
+            <a:r>
+              <a:rPr lang="en-US" dirty="0"/>
+              <a:t>Session #3 – </a:t>
+            </a:r>
+            <a:r>
+              <a:rPr lang="en-US" b="1" dirty="0"/>
+              <a:t>Step #1</a:t>
+            </a:r>
+            <a:r>
+              <a:rPr lang="en-US" dirty="0"/>
+              <a:t>: </a:t>
+            </a:r>
+            <a:r>
+              <a:rPr lang="en-US" dirty="0" err="1"/>
+              <a:t>TextSearch</a:t>
+            </a:r>
+            <a:r>
+              <a:rPr lang="en-US" dirty="0"/>
+              <a:t> -&gt; Functional package with demo</a:t>
+            </a:r>
+          </a:p>
+          <a:p>
+            <a:r>
+              <a:rPr lang="en-US" dirty="0"/>
+              <a:t>Session #4 – </a:t>
+            </a:r>
+            <a:r>
+              <a:rPr lang="en-US" b="1" dirty="0"/>
+              <a:t>Step #2</a:t>
+            </a:r>
+            <a:r>
+              <a:rPr lang="en-US" dirty="0"/>
+              <a:t>: </a:t>
+            </a:r>
+            <a:r>
+              <a:rPr lang="en-US" dirty="0" err="1"/>
+              <a:t>DirNav</a:t>
+            </a:r>
+            <a:r>
+              <a:rPr lang="en-US" dirty="0"/>
+              <a:t> -&gt;			“</a:t>
+            </a:r>
+          </a:p>
+          <a:p>
+            <a:r>
+              <a:rPr lang="en-US" dirty="0"/>
+              <a:t>Session #5 – </a:t>
+            </a:r>
+            <a:r>
+              <a:rPr lang="en-US" b="1" dirty="0"/>
+              <a:t>Step #3</a:t>
+            </a:r>
+            <a:r>
+              <a:rPr lang="en-US" dirty="0"/>
+              <a:t>: </a:t>
+            </a:r>
+            <a:r>
+              <a:rPr lang="en-US" dirty="0" err="1"/>
+              <a:t>CmdlnParser</a:t>
+            </a:r>
+            <a:r>
+              <a:rPr lang="en-US" dirty="0"/>
+              <a:t> -&gt;		“</a:t>
+            </a:r>
+          </a:p>
+          <a:p>
+            <a:r>
+              <a:rPr lang="en-US" dirty="0"/>
+              <a:t>Session #5 – </a:t>
+            </a:r>
+            <a:r>
+              <a:rPr lang="en-US" b="1" dirty="0"/>
+              <a:t>Step #4</a:t>
+            </a:r>
+            <a:r>
+              <a:rPr lang="en-US" dirty="0"/>
+              <a:t>: Executive, Display -&gt; Functional project</a:t>
+            </a:r>
+          </a:p>
+          <a:p>
+            <a:r>
+              <a:rPr lang="en-US" dirty="0"/>
+              <a:t>Session #6 – </a:t>
+            </a:r>
+            <a:r>
+              <a:rPr lang="en-US" dirty="0" err="1"/>
+              <a:t>RegEx</a:t>
+            </a:r>
+            <a:r>
+              <a:rPr lang="en-US" dirty="0"/>
+              <a:t> Extension ?</a:t>
+            </a:r>
+          </a:p>
+          <a:p>
+            <a:r>
+              <a:rPr lang="en-US" dirty="0"/>
+              <a:t>Session #7 – Parallel Text </a:t>
+            </a:r>
+            <a:r>
+              <a:rPr lang="en-US" dirty="0" err="1"/>
+              <a:t>Searh</a:t>
+            </a:r>
+            <a:r>
+              <a:rPr lang="en-US" dirty="0"/>
+              <a:t> ?</a:t>
+            </a:r>
+          </a:p>
+        </p:txBody>
+      </p:sp>
+    </p:spTree>
+    <p:extLst>
+      <p:ext uri="{BB962C8B-B14F-4D97-AF65-F5344CB8AC3E}">
+        <p14:creationId xmlns:p14="http://schemas.microsoft.com/office/powerpoint/2010/main" val="2207619514"/>
+      </p:ext>
+    </p:extLst>
+  </p:cSld>
+  <p:clrMapOvr>
+    <a:masterClrMapping/>
+  </p:clrMapOvr>
+</p:sld>
+</file>
+
+<file path=ppt/slides/slide5.xml><?xml version="1.0" encoding="utf-8"?>
+<p:sld xmlns:a="http://schemas.openxmlformats.org/drawingml/2006/main" xmlns:r="http://schemas.openxmlformats.org/officeDocument/2006/relationships" xmlns:p="http://schemas.openxmlformats.org/presentationml/2006/main">
+  <p:cSld>
+    <p:spTree>
+      <p:nvGrpSpPr>
+        <p:cNvPr id="1" name=""/>
+        <p:cNvGrpSpPr/>
+        <p:nvPr/>
+      </p:nvGrpSpPr>
+      <p:grpSpPr>
+        <a:xfrm>
+          <a:off x="0" y="0"/>
+          <a:ext cx="0" cy="0"/>
+          <a:chOff x="0" y="0"/>
+          <a:chExt cx="0" cy="0"/>
+        </a:xfrm>
+      </p:grpSpPr>
+      <p:sp>
+        <p:nvSpPr>
+          <p:cNvPr id="2" name="Title 1">
+            <a:extLst>
+              <a:ext uri="{FF2B5EF4-FFF2-40B4-BE49-F238E27FC236}">
                 <a16:creationId xmlns:a16="http://schemas.microsoft.com/office/drawing/2014/main" id="{3A1D5CF7-0D4F-4BAE-BA2C-566B721B4B29}"/>
               </a:ext>
             </a:extLst>
@@ -3739,6 +4190,20 @@
           </p:nvPr>
         </p:nvSpPr>
         <p:spPr/>
+        <p:style>
+          <a:lnRef idx="2">
+            <a:schemeClr val="accent3"/>
+          </a:lnRef>
+          <a:fillRef idx="1">
+            <a:schemeClr val="lt1"/>
+          </a:fillRef>
+          <a:effectRef idx="0">
+            <a:schemeClr val="accent3"/>
+          </a:effectRef>
+          <a:fontRef idx="minor">
+            <a:schemeClr val="dk1"/>
+          </a:fontRef>
+        </p:style>
         <p:txBody>
           <a:bodyPr/>
           <a:lstStyle/>
@@ -3838,6 +4303,1052 @@
     <p:extLst>
       <p:ext uri="{BB962C8B-B14F-4D97-AF65-F5344CB8AC3E}">
         <p14:creationId xmlns:p14="http://schemas.microsoft.com/office/powerpoint/2010/main" val="664003782"/>
+      </p:ext>
+    </p:extLst>
+  </p:cSld>
+  <p:clrMapOvr>
+    <a:masterClrMapping/>
+  </p:clrMapOvr>
+</p:sld>
+</file>
+
+<file path=ppt/slides/slide6.xml><?xml version="1.0" encoding="utf-8"?>
+<p:sld xmlns:a="http://schemas.openxmlformats.org/drawingml/2006/main" xmlns:r="http://schemas.openxmlformats.org/officeDocument/2006/relationships" xmlns:p="http://schemas.openxmlformats.org/presentationml/2006/main">
+  <p:cSld>
+    <p:spTree>
+      <p:nvGrpSpPr>
+        <p:cNvPr id="1" name=""/>
+        <p:cNvGrpSpPr/>
+        <p:nvPr/>
+      </p:nvGrpSpPr>
+      <p:grpSpPr>
+        <a:xfrm>
+          <a:off x="0" y="0"/>
+          <a:ext cx="0" cy="0"/>
+          <a:chOff x="0" y="0"/>
+          <a:chExt cx="0" cy="0"/>
+        </a:xfrm>
+      </p:grpSpPr>
+      <p:sp>
+        <p:nvSpPr>
+          <p:cNvPr id="2" name="Title 1">
+            <a:extLst>
+              <a:ext uri="{FF2B5EF4-FFF2-40B4-BE49-F238E27FC236}">
+                <a16:creationId xmlns:a16="http://schemas.microsoft.com/office/drawing/2014/main" id="{D3AE73BD-78AF-48CB-A9EC-9A86B7485967}"/>
+              </a:ext>
+            </a:extLst>
+          </p:cNvPr>
+          <p:cNvSpPr>
+            <a:spLocks noGrp="1"/>
+          </p:cNvSpPr>
+          <p:nvPr>
+            <p:ph type="title"/>
+          </p:nvPr>
+        </p:nvSpPr>
+        <p:spPr/>
+        <p:style>
+          <a:lnRef idx="2">
+            <a:schemeClr val="accent3"/>
+          </a:lnRef>
+          <a:fillRef idx="1">
+            <a:schemeClr val="lt1"/>
+          </a:fillRef>
+          <a:effectRef idx="0">
+            <a:schemeClr val="accent3"/>
+          </a:effectRef>
+          <a:fontRef idx="minor">
+            <a:schemeClr val="dk1"/>
+          </a:fontRef>
+        </p:style>
+        <p:txBody>
+          <a:bodyPr/>
+          <a:lstStyle/>
+          <a:p>
+            <a:r>
+              <a:rPr lang="en-US" dirty="0"/>
+              <a:t> </a:t>
+            </a:r>
+            <a:r>
+              <a:rPr lang="en-US" dirty="0" err="1"/>
+              <a:t>BuildOn</a:t>
+            </a:r>
+            <a:r>
+              <a:rPr lang="en-US" dirty="0"/>
+              <a:t> Introduction Topics</a:t>
+            </a:r>
+          </a:p>
+        </p:txBody>
+      </p:sp>
+      <p:sp>
+        <p:nvSpPr>
+          <p:cNvPr id="3" name="Content Placeholder 2">
+            <a:extLst>
+              <a:ext uri="{FF2B5EF4-FFF2-40B4-BE49-F238E27FC236}">
+                <a16:creationId xmlns:a16="http://schemas.microsoft.com/office/drawing/2014/main" id="{E570FE00-B106-44C2-BB68-B9DEC331C2A3}"/>
+              </a:ext>
+            </a:extLst>
+          </p:cNvPr>
+          <p:cNvSpPr>
+            <a:spLocks noGrp="1"/>
+          </p:cNvSpPr>
+          <p:nvPr>
+            <p:ph sz="half" idx="1"/>
+          </p:nvPr>
+        </p:nvSpPr>
+        <p:spPr>
+          <a:ln/>
+        </p:spPr>
+        <p:style>
+          <a:lnRef idx="2">
+            <a:schemeClr val="accent3"/>
+          </a:lnRef>
+          <a:fillRef idx="1">
+            <a:schemeClr val="lt1"/>
+          </a:fillRef>
+          <a:effectRef idx="0">
+            <a:schemeClr val="accent3"/>
+          </a:effectRef>
+          <a:fontRef idx="minor">
+            <a:schemeClr val="dk1"/>
+          </a:fontRef>
+        </p:style>
+        <p:txBody>
+          <a:bodyPr/>
+          <a:lstStyle/>
+          <a:p>
+            <a:r>
+              <a:rPr lang="en-US" dirty="0" err="1">
+                <a:hlinkClick r:id="rId2"/>
+              </a:rPr>
+              <a:t>BuildOn</a:t>
+            </a:r>
+            <a:r>
+              <a:rPr lang="en-US" dirty="0">
+                <a:hlinkClick r:id="rId2"/>
+              </a:rPr>
+              <a:t> Introduction</a:t>
+            </a:r>
+            <a:endParaRPr lang="en-US" dirty="0"/>
+          </a:p>
+          <a:p>
+            <a:r>
+              <a:rPr lang="en-US" dirty="0">
+                <a:hlinkClick r:id="rId3"/>
+              </a:rPr>
+              <a:t>Step #0</a:t>
+            </a:r>
+            <a:endParaRPr lang="en-US" dirty="0"/>
+          </a:p>
+          <a:p>
+            <a:r>
+              <a:rPr lang="en-US" dirty="0">
+                <a:hlinkClick r:id="rId4"/>
+              </a:rPr>
+              <a:t>Step #1</a:t>
+            </a:r>
+            <a:endParaRPr lang="en-US" dirty="0"/>
+          </a:p>
+          <a:p>
+            <a:r>
+              <a:rPr lang="en-US" dirty="0">
+                <a:hlinkClick r:id="rId5"/>
+              </a:rPr>
+              <a:t>Site Map</a:t>
+            </a:r>
+            <a:endParaRPr lang="en-US" dirty="0"/>
+          </a:p>
+          <a:p>
+            <a:pPr lvl="1"/>
+            <a:r>
+              <a:rPr lang="en-US" dirty="0">
+                <a:hlinkClick r:id="rId6"/>
+              </a:rPr>
+              <a:t>Site Design</a:t>
+            </a:r>
+            <a:endParaRPr lang="en-US" dirty="0"/>
+          </a:p>
+          <a:p>
+            <a:pPr lvl="1"/>
+            <a:r>
+              <a:rPr lang="en-US" dirty="0">
+                <a:hlinkClick r:id="rId5"/>
+              </a:rPr>
+              <a:t>Starting Trail - quick peek at items</a:t>
+            </a:r>
+            <a:endParaRPr lang="en-US" dirty="0"/>
+          </a:p>
+          <a:p>
+            <a:pPr lvl="1"/>
+            <a:r>
+              <a:rPr lang="en-US" dirty="0">
+                <a:hlinkClick r:id="rId7"/>
+              </a:rPr>
+              <a:t>Starting Trail – Start</a:t>
+            </a:r>
+            <a:endParaRPr lang="en-US" dirty="0"/>
+          </a:p>
+          <a:p>
+            <a:pPr lvl="1"/>
+            <a:r>
+              <a:rPr lang="en-US" dirty="0">
+                <a:hlinkClick r:id="rId8"/>
+              </a:rPr>
+              <a:t>Starting Trail – Tooling</a:t>
+            </a:r>
+            <a:endParaRPr lang="en-US" dirty="0"/>
+          </a:p>
+          <a:p>
+            <a:pPr lvl="1"/>
+            <a:r>
+              <a:rPr lang="en-US" dirty="0">
+                <a:hlinkClick r:id="rId9"/>
+              </a:rPr>
+              <a:t>Starting Trail - Rust Libs</a:t>
+            </a:r>
+            <a:endParaRPr lang="en-US" dirty="0"/>
+          </a:p>
+        </p:txBody>
+      </p:sp>
+      <p:sp>
+        <p:nvSpPr>
+          <p:cNvPr id="4" name="Content Placeholder 3">
+            <a:extLst>
+              <a:ext uri="{FF2B5EF4-FFF2-40B4-BE49-F238E27FC236}">
+                <a16:creationId xmlns:a16="http://schemas.microsoft.com/office/drawing/2014/main" id="{218F4C6B-4B07-46DE-A44D-20A98F13D6B1}"/>
+              </a:ext>
+            </a:extLst>
+          </p:cNvPr>
+          <p:cNvSpPr>
+            <a:spLocks noGrp="1"/>
+          </p:cNvSpPr>
+          <p:nvPr>
+            <p:ph sz="half" idx="2"/>
+          </p:nvPr>
+        </p:nvSpPr>
+        <p:spPr>
+          <a:ln/>
+        </p:spPr>
+        <p:style>
+          <a:lnRef idx="2">
+            <a:schemeClr val="accent3"/>
+          </a:lnRef>
+          <a:fillRef idx="1">
+            <a:schemeClr val="lt1"/>
+          </a:fillRef>
+          <a:effectRef idx="0">
+            <a:schemeClr val="accent3"/>
+          </a:effectRef>
+          <a:fontRef idx="minor">
+            <a:schemeClr val="dk1"/>
+          </a:fontRef>
+        </p:style>
+        <p:txBody>
+          <a:bodyPr/>
+          <a:lstStyle/>
+          <a:p>
+            <a:r>
+              <a:rPr lang="en-US" dirty="0">
+                <a:hlinkClick r:id="rId10"/>
+              </a:rPr>
+              <a:t>Rust std::lib</a:t>
+            </a:r>
+            <a:endParaRPr lang="en-US" dirty="0"/>
+          </a:p>
+          <a:p>
+            <a:r>
+              <a:rPr lang="en-US" dirty="0">
+                <a:hlinkClick r:id="rId11"/>
+              </a:rPr>
+              <a:t>Rust Bites</a:t>
+            </a:r>
+            <a:endParaRPr lang="en-US" dirty="0"/>
+          </a:p>
+          <a:p>
+            <a:r>
+              <a:rPr lang="en-US" dirty="0">
+                <a:hlinkClick r:id="rId12"/>
+              </a:rPr>
+              <a:t>Rust Story</a:t>
+            </a:r>
+            <a:endParaRPr lang="en-US" dirty="0"/>
+          </a:p>
+          <a:p>
+            <a:r>
+              <a:rPr lang="en-US" dirty="0" err="1">
+                <a:hlinkClick r:id="rId2"/>
+              </a:rPr>
+              <a:t>BuildOn</a:t>
+            </a:r>
+            <a:endParaRPr lang="en-US" dirty="0"/>
+          </a:p>
+          <a:p>
+            <a:r>
+              <a:rPr lang="en-US" dirty="0">
+                <a:hlinkClick r:id="rId13"/>
+              </a:rPr>
+              <a:t>Rust Repository</a:t>
+            </a:r>
+            <a:endParaRPr lang="en-US" dirty="0"/>
+          </a:p>
+        </p:txBody>
+      </p:sp>
+    </p:spTree>
+    <p:extLst>
+      <p:ext uri="{BB962C8B-B14F-4D97-AF65-F5344CB8AC3E}">
+        <p14:creationId xmlns:p14="http://schemas.microsoft.com/office/powerpoint/2010/main" val="1363403664"/>
+      </p:ext>
+    </p:extLst>
+  </p:cSld>
+  <p:clrMapOvr>
+    <a:masterClrMapping/>
+  </p:clrMapOvr>
+</p:sld>
+</file>
+
+<file path=ppt/slides/slide7.xml><?xml version="1.0" encoding="utf-8"?>
+<p:sld xmlns:a="http://schemas.openxmlformats.org/drawingml/2006/main" xmlns:r="http://schemas.openxmlformats.org/officeDocument/2006/relationships" xmlns:p="http://schemas.openxmlformats.org/presentationml/2006/main">
+  <p:cSld>
+    <p:spTree>
+      <p:nvGrpSpPr>
+        <p:cNvPr id="1" name=""/>
+        <p:cNvGrpSpPr/>
+        <p:nvPr/>
+      </p:nvGrpSpPr>
+      <p:grpSpPr>
+        <a:xfrm>
+          <a:off x="0" y="0"/>
+          <a:ext cx="0" cy="0"/>
+          <a:chOff x="0" y="0"/>
+          <a:chExt cx="0" cy="0"/>
+        </a:xfrm>
+      </p:grpSpPr>
+      <p:sp>
+        <p:nvSpPr>
+          <p:cNvPr id="2" name="Title 1">
+            <a:extLst>
+              <a:ext uri="{FF2B5EF4-FFF2-40B4-BE49-F238E27FC236}">
+                <a16:creationId xmlns:a16="http://schemas.microsoft.com/office/drawing/2014/main" id="{A4A1A110-42E1-4A35-92C4-A678FFE8A307}"/>
+              </a:ext>
+            </a:extLst>
+          </p:cNvPr>
+          <p:cNvSpPr>
+            <a:spLocks noGrp="1"/>
+          </p:cNvSpPr>
+          <p:nvPr>
+            <p:ph type="title"/>
+          </p:nvPr>
+        </p:nvSpPr>
+        <p:spPr/>
+        <p:style>
+          <a:lnRef idx="2">
+            <a:schemeClr val="accent3"/>
+          </a:lnRef>
+          <a:fillRef idx="1">
+            <a:schemeClr val="lt1"/>
+          </a:fillRef>
+          <a:effectRef idx="0">
+            <a:schemeClr val="accent3"/>
+          </a:effectRef>
+          <a:fontRef idx="minor">
+            <a:schemeClr val="dk1"/>
+          </a:fontRef>
+        </p:style>
+        <p:txBody>
+          <a:bodyPr/>
+          <a:lstStyle/>
+          <a:p>
+            <a:r>
+              <a:rPr lang="en-US" dirty="0"/>
+              <a:t>Next </a:t>
+            </a:r>
+            <a:r>
+              <a:rPr lang="en-US" dirty="0" err="1"/>
+              <a:t>BuildOn</a:t>
+            </a:r>
+            <a:r>
+              <a:rPr lang="en-US" dirty="0"/>
+              <a:t> – Session #2</a:t>
+            </a:r>
+          </a:p>
+        </p:txBody>
+      </p:sp>
+      <p:sp>
+        <p:nvSpPr>
+          <p:cNvPr id="4" name="Text Placeholder 3">
+            <a:extLst>
+              <a:ext uri="{FF2B5EF4-FFF2-40B4-BE49-F238E27FC236}">
+                <a16:creationId xmlns:a16="http://schemas.microsoft.com/office/drawing/2014/main" id="{72EBEF3F-5A6C-4669-B46A-2439E922063E}"/>
+              </a:ext>
+            </a:extLst>
+          </p:cNvPr>
+          <p:cNvSpPr>
+            <a:spLocks noGrp="1"/>
+          </p:cNvSpPr>
+          <p:nvPr>
+            <p:ph type="body" idx="1"/>
+          </p:nvPr>
+        </p:nvSpPr>
+        <p:spPr/>
+        <p:txBody>
+          <a:bodyPr>
+            <a:normAutofit/>
+          </a:bodyPr>
+          <a:lstStyle/>
+          <a:p>
+            <a:r>
+              <a:rPr lang="en-US" sz="2800" dirty="0"/>
+              <a:t>Project Review</a:t>
+            </a:r>
+          </a:p>
+        </p:txBody>
+      </p:sp>
+      <p:sp>
+        <p:nvSpPr>
+          <p:cNvPr id="3" name="Content Placeholder 2">
+            <a:extLst>
+              <a:ext uri="{FF2B5EF4-FFF2-40B4-BE49-F238E27FC236}">
+                <a16:creationId xmlns:a16="http://schemas.microsoft.com/office/drawing/2014/main" id="{0CAF5A3B-6F24-4AF6-9031-2F2B88373BE3}"/>
+              </a:ext>
+            </a:extLst>
+          </p:cNvPr>
+          <p:cNvSpPr>
+            <a:spLocks noGrp="1"/>
+          </p:cNvSpPr>
+          <p:nvPr>
+            <p:ph sz="half" idx="2"/>
+          </p:nvPr>
+        </p:nvSpPr>
+        <p:spPr>
+          <a:xfrm>
+            <a:off x="839788" y="2533650"/>
+            <a:ext cx="5157787" cy="3684588"/>
+          </a:xfrm>
+          <a:ln/>
+        </p:spPr>
+        <p:style>
+          <a:lnRef idx="2">
+            <a:schemeClr val="accent3"/>
+          </a:lnRef>
+          <a:fillRef idx="1">
+            <a:schemeClr val="lt1"/>
+          </a:fillRef>
+          <a:effectRef idx="0">
+            <a:schemeClr val="accent3"/>
+          </a:effectRef>
+          <a:fontRef idx="minor">
+            <a:schemeClr val="dk1"/>
+          </a:fontRef>
+        </p:style>
+        <p:txBody>
+          <a:bodyPr/>
+          <a:lstStyle/>
+          <a:p>
+            <a:r>
+              <a:rPr lang="en-US" dirty="0">
+                <a:hlinkClick r:id="rId2"/>
+              </a:rPr>
+              <a:t>Step #0</a:t>
+            </a:r>
+            <a:endParaRPr lang="en-US" dirty="0"/>
+          </a:p>
+          <a:p>
+            <a:pPr lvl="1"/>
+            <a:r>
+              <a:rPr lang="en-US" dirty="0"/>
+              <a:t>The </a:t>
+            </a:r>
+            <a:r>
+              <a:rPr lang="en-US" dirty="0" err="1"/>
+              <a:t>BuildOn</a:t>
+            </a:r>
+            <a:r>
+              <a:rPr lang="en-US" dirty="0"/>
+              <a:t> Project</a:t>
+            </a:r>
+          </a:p>
+          <a:p>
+            <a:r>
+              <a:rPr lang="en-US" dirty="0">
+                <a:hlinkClick r:id="rId3"/>
+              </a:rPr>
+              <a:t>Step #1</a:t>
+            </a:r>
+            <a:endParaRPr lang="en-US" dirty="0"/>
+          </a:p>
+          <a:p>
+            <a:pPr lvl="1"/>
+            <a:r>
+              <a:rPr lang="en-US" dirty="0"/>
+              <a:t>Text Search package</a:t>
+            </a:r>
+          </a:p>
+          <a:p>
+            <a:pPr lvl="1"/>
+            <a:r>
+              <a:rPr lang="en-US" dirty="0"/>
+              <a:t>Look at Starter Code</a:t>
+            </a:r>
+          </a:p>
+        </p:txBody>
+      </p:sp>
+      <p:sp>
+        <p:nvSpPr>
+          <p:cNvPr id="5" name="Text Placeholder 4">
+            <a:extLst>
+              <a:ext uri="{FF2B5EF4-FFF2-40B4-BE49-F238E27FC236}">
+                <a16:creationId xmlns:a16="http://schemas.microsoft.com/office/drawing/2014/main" id="{A061DA82-BF3E-4C99-B8B8-8633F2569885}"/>
+              </a:ext>
+            </a:extLst>
+          </p:cNvPr>
+          <p:cNvSpPr>
+            <a:spLocks noGrp="1"/>
+          </p:cNvSpPr>
+          <p:nvPr>
+            <p:ph type="body" sz="quarter" idx="3"/>
+          </p:nvPr>
+        </p:nvSpPr>
+        <p:spPr/>
+        <p:txBody>
+          <a:bodyPr>
+            <a:normAutofit/>
+          </a:bodyPr>
+          <a:lstStyle/>
+          <a:p>
+            <a:r>
+              <a:rPr lang="en-US" sz="2800" dirty="0"/>
+              <a:t>Rust</a:t>
+            </a:r>
+          </a:p>
+        </p:txBody>
+      </p:sp>
+      <p:sp>
+        <p:nvSpPr>
+          <p:cNvPr id="6" name="Content Placeholder 5">
+            <a:extLst>
+              <a:ext uri="{FF2B5EF4-FFF2-40B4-BE49-F238E27FC236}">
+                <a16:creationId xmlns:a16="http://schemas.microsoft.com/office/drawing/2014/main" id="{730A4F1F-A3A0-46E6-901D-EB9D60C3E169}"/>
+              </a:ext>
+            </a:extLst>
+          </p:cNvPr>
+          <p:cNvSpPr>
+            <a:spLocks noGrp="1"/>
+          </p:cNvSpPr>
+          <p:nvPr>
+            <p:ph sz="quarter" idx="4"/>
+          </p:nvPr>
+        </p:nvSpPr>
+        <p:spPr>
+          <a:ln/>
+        </p:spPr>
+        <p:style>
+          <a:lnRef idx="2">
+            <a:schemeClr val="accent3"/>
+          </a:lnRef>
+          <a:fillRef idx="1">
+            <a:schemeClr val="lt1"/>
+          </a:fillRef>
+          <a:effectRef idx="0">
+            <a:schemeClr val="accent3"/>
+          </a:effectRef>
+          <a:fontRef idx="minor">
+            <a:schemeClr val="dk1"/>
+          </a:fontRef>
+        </p:style>
+        <p:txBody>
+          <a:bodyPr/>
+          <a:lstStyle/>
+          <a:p>
+            <a:r>
+              <a:rPr lang="en-US" dirty="0">
+                <a:hlinkClick r:id="rId4"/>
+              </a:rPr>
+              <a:t>Rust Safety</a:t>
+            </a:r>
+            <a:endParaRPr lang="en-US" dirty="0"/>
+          </a:p>
+          <a:p>
+            <a:r>
+              <a:rPr lang="en-US" dirty="0">
+                <a:hlinkClick r:id="rId5"/>
+              </a:rPr>
+              <a:t>Rust Error Handling</a:t>
+            </a:r>
+            <a:endParaRPr lang="en-US" dirty="0"/>
+          </a:p>
+          <a:p>
+            <a:r>
+              <a:rPr lang="en-US" dirty="0"/>
+              <a:t>Answer Questions</a:t>
+            </a:r>
+          </a:p>
+          <a:p>
+            <a:pPr marL="0" indent="0">
+              <a:buNone/>
+            </a:pPr>
+            <a:endParaRPr lang="en-US" dirty="0"/>
+          </a:p>
+        </p:txBody>
+      </p:sp>
+    </p:spTree>
+    <p:extLst>
+      <p:ext uri="{BB962C8B-B14F-4D97-AF65-F5344CB8AC3E}">
+        <p14:creationId xmlns:p14="http://schemas.microsoft.com/office/powerpoint/2010/main" val="3150932224"/>
+      </p:ext>
+    </p:extLst>
+  </p:cSld>
+  <p:clrMapOvr>
+    <a:masterClrMapping/>
+  </p:clrMapOvr>
+</p:sld>
+</file>
+
+<file path=ppt/slides/slide8.xml><?xml version="1.0" encoding="utf-8"?>
+<p:sld xmlns:a="http://schemas.openxmlformats.org/drawingml/2006/main" xmlns:r="http://schemas.openxmlformats.org/officeDocument/2006/relationships" xmlns:p="http://schemas.openxmlformats.org/presentationml/2006/main">
+  <p:cSld>
+    <p:spTree>
+      <p:nvGrpSpPr>
+        <p:cNvPr id="1" name=""/>
+        <p:cNvGrpSpPr/>
+        <p:nvPr/>
+      </p:nvGrpSpPr>
+      <p:grpSpPr>
+        <a:xfrm>
+          <a:off x="0" y="0"/>
+          <a:ext cx="0" cy="0"/>
+          <a:chOff x="0" y="0"/>
+          <a:chExt cx="0" cy="0"/>
+        </a:xfrm>
+      </p:grpSpPr>
+      <p:sp>
+        <p:nvSpPr>
+          <p:cNvPr id="2" name="Title 1">
+            <a:extLst>
+              <a:ext uri="{FF2B5EF4-FFF2-40B4-BE49-F238E27FC236}">
+                <a16:creationId xmlns:a16="http://schemas.microsoft.com/office/drawing/2014/main" id="{4CEB71DD-6811-467E-B7F1-32D177C96097}"/>
+              </a:ext>
+            </a:extLst>
+          </p:cNvPr>
+          <p:cNvSpPr>
+            <a:spLocks noGrp="1"/>
+          </p:cNvSpPr>
+          <p:nvPr>
+            <p:ph type="title"/>
+          </p:nvPr>
+        </p:nvSpPr>
+        <p:spPr/>
+        <p:style>
+          <a:lnRef idx="2">
+            <a:schemeClr val="accent3"/>
+          </a:lnRef>
+          <a:fillRef idx="1">
+            <a:schemeClr val="lt1"/>
+          </a:fillRef>
+          <a:effectRef idx="0">
+            <a:schemeClr val="accent3"/>
+          </a:effectRef>
+          <a:fontRef idx="minor">
+            <a:schemeClr val="dk1"/>
+          </a:fontRef>
+        </p:style>
+        <p:txBody>
+          <a:bodyPr/>
+          <a:lstStyle/>
+          <a:p>
+            <a:r>
+              <a:rPr lang="en-US" dirty="0" err="1"/>
+              <a:t>BuildOn</a:t>
+            </a:r>
+            <a:r>
+              <a:rPr lang="en-US" dirty="0"/>
+              <a:t> – Session #3</a:t>
+            </a:r>
+          </a:p>
+        </p:txBody>
+      </p:sp>
+      <p:sp>
+        <p:nvSpPr>
+          <p:cNvPr id="3" name="Text Placeholder 2">
+            <a:extLst>
+              <a:ext uri="{FF2B5EF4-FFF2-40B4-BE49-F238E27FC236}">
+                <a16:creationId xmlns:a16="http://schemas.microsoft.com/office/drawing/2014/main" id="{F267BC7A-4285-49F9-9A3B-482D3EA4A94F}"/>
+              </a:ext>
+            </a:extLst>
+          </p:cNvPr>
+          <p:cNvSpPr>
+            <a:spLocks noGrp="1"/>
+          </p:cNvSpPr>
+          <p:nvPr>
+            <p:ph type="body" idx="1"/>
+          </p:nvPr>
+        </p:nvSpPr>
+        <p:spPr/>
+        <p:txBody>
+          <a:bodyPr>
+            <a:normAutofit/>
+          </a:bodyPr>
+          <a:lstStyle/>
+          <a:p>
+            <a:r>
+              <a:rPr lang="en-US" sz="2800" dirty="0"/>
+              <a:t>Project</a:t>
+            </a:r>
+          </a:p>
+        </p:txBody>
+      </p:sp>
+      <p:sp>
+        <p:nvSpPr>
+          <p:cNvPr id="4" name="Content Placeholder 3">
+            <a:extLst>
+              <a:ext uri="{FF2B5EF4-FFF2-40B4-BE49-F238E27FC236}">
+                <a16:creationId xmlns:a16="http://schemas.microsoft.com/office/drawing/2014/main" id="{28C11C67-A00E-460D-B922-E4BF7788FF04}"/>
+              </a:ext>
+            </a:extLst>
+          </p:cNvPr>
+          <p:cNvSpPr>
+            <a:spLocks noGrp="1"/>
+          </p:cNvSpPr>
+          <p:nvPr>
+            <p:ph sz="half" idx="2"/>
+          </p:nvPr>
+        </p:nvSpPr>
+        <p:spPr>
+          <a:xfrm>
+            <a:off x="839788" y="2533650"/>
+            <a:ext cx="5157787" cy="3684588"/>
+          </a:xfrm>
+          <a:ln/>
+        </p:spPr>
+        <p:style>
+          <a:lnRef idx="2">
+            <a:schemeClr val="accent3"/>
+          </a:lnRef>
+          <a:fillRef idx="1">
+            <a:schemeClr val="lt1"/>
+          </a:fillRef>
+          <a:effectRef idx="0">
+            <a:schemeClr val="accent3"/>
+          </a:effectRef>
+          <a:fontRef idx="minor">
+            <a:schemeClr val="dk1"/>
+          </a:fontRef>
+        </p:style>
+        <p:txBody>
+          <a:bodyPr/>
+          <a:lstStyle/>
+          <a:p>
+            <a:r>
+              <a:rPr lang="en-US" dirty="0"/>
+              <a:t>Code review: </a:t>
+            </a:r>
+            <a:r>
+              <a:rPr lang="en-US" dirty="0">
+                <a:hlinkClick r:id="rId2"/>
+              </a:rPr>
+              <a:t>Step #1 - </a:t>
+            </a:r>
+            <a:r>
+              <a:rPr lang="en-US" dirty="0" err="1">
+                <a:hlinkClick r:id="rId2"/>
+              </a:rPr>
+              <a:t>TxtSrch</a:t>
+            </a:r>
+            <a:endParaRPr lang="en-US" dirty="0"/>
+          </a:p>
+          <a:p>
+            <a:pPr lvl="1"/>
+            <a:r>
+              <a:rPr lang="en-US" dirty="0"/>
+              <a:t>Code will be posted</a:t>
+            </a:r>
+          </a:p>
+          <a:p>
+            <a:r>
+              <a:rPr lang="en-US" dirty="0">
+                <a:hlinkClick r:id="rId3"/>
+              </a:rPr>
+              <a:t>Step #2 – </a:t>
+            </a:r>
+            <a:r>
+              <a:rPr lang="en-US" dirty="0" err="1">
+                <a:hlinkClick r:id="rId3"/>
+              </a:rPr>
+              <a:t>DirNav</a:t>
+            </a:r>
+            <a:endParaRPr lang="en-US" dirty="0"/>
+          </a:p>
+          <a:p>
+            <a:pPr lvl="1"/>
+            <a:r>
+              <a:rPr lang="en-US" dirty="0"/>
+              <a:t>Specification</a:t>
+            </a:r>
+          </a:p>
+          <a:p>
+            <a:pPr lvl="1"/>
+            <a:r>
+              <a:rPr lang="en-US" dirty="0"/>
+              <a:t>Starter code</a:t>
+            </a:r>
+          </a:p>
+        </p:txBody>
+      </p:sp>
+      <p:sp>
+        <p:nvSpPr>
+          <p:cNvPr id="5" name="Text Placeholder 4">
+            <a:extLst>
+              <a:ext uri="{FF2B5EF4-FFF2-40B4-BE49-F238E27FC236}">
+                <a16:creationId xmlns:a16="http://schemas.microsoft.com/office/drawing/2014/main" id="{20959C9D-A673-4B22-A614-0FC3F88A2C12}"/>
+              </a:ext>
+            </a:extLst>
+          </p:cNvPr>
+          <p:cNvSpPr>
+            <a:spLocks noGrp="1"/>
+          </p:cNvSpPr>
+          <p:nvPr>
+            <p:ph type="body" sz="quarter" idx="3"/>
+          </p:nvPr>
+        </p:nvSpPr>
+        <p:spPr/>
+        <p:txBody>
+          <a:bodyPr>
+            <a:normAutofit/>
+          </a:bodyPr>
+          <a:lstStyle/>
+          <a:p>
+            <a:r>
+              <a:rPr lang="en-US" sz="2800" dirty="0"/>
+              <a:t>Rust</a:t>
+            </a:r>
+          </a:p>
+        </p:txBody>
+      </p:sp>
+      <p:sp>
+        <p:nvSpPr>
+          <p:cNvPr id="6" name="Content Placeholder 5">
+            <a:extLst>
+              <a:ext uri="{FF2B5EF4-FFF2-40B4-BE49-F238E27FC236}">
+                <a16:creationId xmlns:a16="http://schemas.microsoft.com/office/drawing/2014/main" id="{617CD398-5F2A-4F58-ABA5-74BFCD22B1C2}"/>
+              </a:ext>
+            </a:extLst>
+          </p:cNvPr>
+          <p:cNvSpPr>
+            <a:spLocks noGrp="1"/>
+          </p:cNvSpPr>
+          <p:nvPr>
+            <p:ph sz="quarter" idx="4"/>
+          </p:nvPr>
+        </p:nvSpPr>
+        <p:spPr>
+          <a:ln/>
+        </p:spPr>
+        <p:style>
+          <a:lnRef idx="2">
+            <a:schemeClr val="accent3"/>
+          </a:lnRef>
+          <a:fillRef idx="1">
+            <a:schemeClr val="lt1"/>
+          </a:fillRef>
+          <a:effectRef idx="0">
+            <a:schemeClr val="accent3"/>
+          </a:effectRef>
+          <a:fontRef idx="minor">
+            <a:schemeClr val="dk1"/>
+          </a:fontRef>
+        </p:style>
+        <p:txBody>
+          <a:bodyPr/>
+          <a:lstStyle/>
+          <a:p>
+            <a:r>
+              <a:rPr lang="en-US" dirty="0">
+                <a:hlinkClick r:id="rId4"/>
+              </a:rPr>
+              <a:t>Structs</a:t>
+            </a:r>
+            <a:endParaRPr lang="en-US" dirty="0"/>
+          </a:p>
+          <a:p>
+            <a:r>
+              <a:rPr lang="en-US" dirty="0">
+                <a:hlinkClick r:id="rId5"/>
+              </a:rPr>
+              <a:t>Rust Libs</a:t>
+            </a:r>
+            <a:endParaRPr lang="en-US" dirty="0"/>
+          </a:p>
+          <a:p>
+            <a:r>
+              <a:rPr lang="en-US" dirty="0">
+                <a:hlinkClick r:id="rId6"/>
+              </a:rPr>
+              <a:t>Rust std::fs</a:t>
+            </a:r>
+            <a:endParaRPr lang="en-US" dirty="0"/>
+          </a:p>
+          <a:p>
+            <a:r>
+              <a:rPr lang="en-US" dirty="0"/>
+              <a:t>Answer Questions</a:t>
+            </a:r>
+          </a:p>
+        </p:txBody>
+      </p:sp>
+    </p:spTree>
+    <p:extLst>
+      <p:ext uri="{BB962C8B-B14F-4D97-AF65-F5344CB8AC3E}">
+        <p14:creationId xmlns:p14="http://schemas.microsoft.com/office/powerpoint/2010/main" val="2462287988"/>
+      </p:ext>
+    </p:extLst>
+  </p:cSld>
+  <p:clrMapOvr>
+    <a:masterClrMapping/>
+  </p:clrMapOvr>
+</p:sld>
+</file>
+
+<file path=ppt/slides/slide9.xml><?xml version="1.0" encoding="utf-8"?>
+<p:sld xmlns:a="http://schemas.openxmlformats.org/drawingml/2006/main" xmlns:r="http://schemas.openxmlformats.org/officeDocument/2006/relationships" xmlns:p="http://schemas.openxmlformats.org/presentationml/2006/main">
+  <p:cSld>
+    <p:spTree>
+      <p:nvGrpSpPr>
+        <p:cNvPr id="1" name=""/>
+        <p:cNvGrpSpPr/>
+        <p:nvPr/>
+      </p:nvGrpSpPr>
+      <p:grpSpPr>
+        <a:xfrm>
+          <a:off x="0" y="0"/>
+          <a:ext cx="0" cy="0"/>
+          <a:chOff x="0" y="0"/>
+          <a:chExt cx="0" cy="0"/>
+        </a:xfrm>
+      </p:grpSpPr>
+      <p:sp>
+        <p:nvSpPr>
+          <p:cNvPr id="8" name="Title 7">
+            <a:extLst>
+              <a:ext uri="{FF2B5EF4-FFF2-40B4-BE49-F238E27FC236}">
+                <a16:creationId xmlns:a16="http://schemas.microsoft.com/office/drawing/2014/main" id="{6AED2634-DADD-4809-95B9-F1BE61A1FF9E}"/>
+              </a:ext>
+            </a:extLst>
+          </p:cNvPr>
+          <p:cNvSpPr>
+            <a:spLocks noGrp="1"/>
+          </p:cNvSpPr>
+          <p:nvPr>
+            <p:ph type="title"/>
+          </p:nvPr>
+        </p:nvSpPr>
+        <p:spPr/>
+        <p:style>
+          <a:lnRef idx="2">
+            <a:schemeClr val="accent3"/>
+          </a:lnRef>
+          <a:fillRef idx="1">
+            <a:schemeClr val="lt1"/>
+          </a:fillRef>
+          <a:effectRef idx="0">
+            <a:schemeClr val="accent3"/>
+          </a:effectRef>
+          <a:fontRef idx="minor">
+            <a:schemeClr val="dk1"/>
+          </a:fontRef>
+        </p:style>
+        <p:txBody>
+          <a:bodyPr/>
+          <a:lstStyle/>
+          <a:p>
+            <a:r>
+              <a:rPr lang="en-US" dirty="0" err="1"/>
+              <a:t>BuildOn</a:t>
+            </a:r>
+            <a:endParaRPr lang="en-US" dirty="0"/>
+          </a:p>
+        </p:txBody>
+      </p:sp>
+      <p:sp>
+        <p:nvSpPr>
+          <p:cNvPr id="9" name="Content Placeholder 8">
+            <a:extLst>
+              <a:ext uri="{FF2B5EF4-FFF2-40B4-BE49-F238E27FC236}">
+                <a16:creationId xmlns:a16="http://schemas.microsoft.com/office/drawing/2014/main" id="{2C8FCC58-3F18-417F-873E-B7E9C6914DC8}"/>
+              </a:ext>
+            </a:extLst>
+          </p:cNvPr>
+          <p:cNvSpPr>
+            <a:spLocks noGrp="1"/>
+          </p:cNvSpPr>
+          <p:nvPr>
+            <p:ph idx="1"/>
+          </p:nvPr>
+        </p:nvSpPr>
+        <p:spPr/>
+        <p:txBody>
+          <a:bodyPr/>
+          <a:lstStyle/>
+          <a:p>
+            <a:r>
+              <a:rPr lang="en-US" dirty="0"/>
+              <a:t>Session #4</a:t>
+            </a:r>
+          </a:p>
+          <a:p>
+            <a:pPr lvl="1"/>
+            <a:r>
+              <a:rPr lang="en-US" dirty="0" err="1"/>
+              <a:t>CmdlnParser</a:t>
+            </a:r>
+            <a:endParaRPr lang="en-US" dirty="0"/>
+          </a:p>
+          <a:p>
+            <a:r>
+              <a:rPr lang="en-US" dirty="0"/>
+              <a:t>Session #5</a:t>
+            </a:r>
+          </a:p>
+          <a:p>
+            <a:pPr lvl="1"/>
+            <a:r>
+              <a:rPr lang="en-US" dirty="0"/>
+              <a:t>Executive &amp; Display</a:t>
+            </a:r>
+          </a:p>
+          <a:p>
+            <a:r>
+              <a:rPr lang="en-US" dirty="0"/>
+              <a:t>Session #6 ?</a:t>
+            </a:r>
+          </a:p>
+          <a:p>
+            <a:pPr lvl="1"/>
+            <a:r>
+              <a:rPr lang="en-US" dirty="0" err="1"/>
+              <a:t>RegEx</a:t>
+            </a:r>
+            <a:r>
+              <a:rPr lang="en-US" dirty="0"/>
+              <a:t> Search</a:t>
+            </a:r>
+          </a:p>
+          <a:p>
+            <a:r>
+              <a:rPr lang="en-US" dirty="0"/>
+              <a:t>Session #7 ?</a:t>
+            </a:r>
+          </a:p>
+          <a:p>
+            <a:pPr lvl="1"/>
+            <a:r>
+              <a:rPr lang="en-US" dirty="0"/>
+              <a:t>Parallel Text Search</a:t>
+            </a:r>
+          </a:p>
+        </p:txBody>
+      </p:sp>
+    </p:spTree>
+    <p:extLst>
+      <p:ext uri="{BB962C8B-B14F-4D97-AF65-F5344CB8AC3E}">
+        <p14:creationId xmlns:p14="http://schemas.microsoft.com/office/powerpoint/2010/main" val="450875661"/>
       </p:ext>
     </p:extLst>
   </p:cSld>

</xml_diff>

<commit_message>
minor changes to text
</commit_message>
<xml_diff>
--- a/Build-On.pptx
+++ b/Build-On.pptx
@@ -268,7 +268,7 @@
           <a:p>
             <a:fld id="{62A8A12F-4B01-424F-AD07-F42ED760B84B}" type="datetimeFigureOut">
               <a:rPr lang="en-US" smtClean="0"/>
-              <a:t>2/10/2021</a:t>
+              <a:t>2/12/2021</a:t>
             </a:fld>
             <a:endParaRPr lang="en-US"/>
           </a:p>
@@ -466,7 +466,7 @@
           <a:p>
             <a:fld id="{62A8A12F-4B01-424F-AD07-F42ED760B84B}" type="datetimeFigureOut">
               <a:rPr lang="en-US" smtClean="0"/>
-              <a:t>2/10/2021</a:t>
+              <a:t>2/12/2021</a:t>
             </a:fld>
             <a:endParaRPr lang="en-US"/>
           </a:p>
@@ -674,7 +674,7 @@
           <a:p>
             <a:fld id="{62A8A12F-4B01-424F-AD07-F42ED760B84B}" type="datetimeFigureOut">
               <a:rPr lang="en-US" smtClean="0"/>
-              <a:t>2/10/2021</a:t>
+              <a:t>2/12/2021</a:t>
             </a:fld>
             <a:endParaRPr lang="en-US"/>
           </a:p>
@@ -872,7 +872,7 @@
           <a:p>
             <a:fld id="{62A8A12F-4B01-424F-AD07-F42ED760B84B}" type="datetimeFigureOut">
               <a:rPr lang="en-US" smtClean="0"/>
-              <a:t>2/10/2021</a:t>
+              <a:t>2/12/2021</a:t>
             </a:fld>
             <a:endParaRPr lang="en-US"/>
           </a:p>
@@ -1147,7 +1147,7 @@
           <a:p>
             <a:fld id="{62A8A12F-4B01-424F-AD07-F42ED760B84B}" type="datetimeFigureOut">
               <a:rPr lang="en-US" smtClean="0"/>
-              <a:t>2/10/2021</a:t>
+              <a:t>2/12/2021</a:t>
             </a:fld>
             <a:endParaRPr lang="en-US"/>
           </a:p>
@@ -1412,7 +1412,7 @@
           <a:p>
             <a:fld id="{62A8A12F-4B01-424F-AD07-F42ED760B84B}" type="datetimeFigureOut">
               <a:rPr lang="en-US" smtClean="0"/>
-              <a:t>2/10/2021</a:t>
+              <a:t>2/12/2021</a:t>
             </a:fld>
             <a:endParaRPr lang="en-US"/>
           </a:p>
@@ -1824,7 +1824,7 @@
           <a:p>
             <a:fld id="{62A8A12F-4B01-424F-AD07-F42ED760B84B}" type="datetimeFigureOut">
               <a:rPr lang="en-US" smtClean="0"/>
-              <a:t>2/10/2021</a:t>
+              <a:t>2/12/2021</a:t>
             </a:fld>
             <a:endParaRPr lang="en-US"/>
           </a:p>
@@ -1965,7 +1965,7 @@
           <a:p>
             <a:fld id="{62A8A12F-4B01-424F-AD07-F42ED760B84B}" type="datetimeFigureOut">
               <a:rPr lang="en-US" smtClean="0"/>
-              <a:t>2/10/2021</a:t>
+              <a:t>2/12/2021</a:t>
             </a:fld>
             <a:endParaRPr lang="en-US"/>
           </a:p>
@@ -2078,7 +2078,7 @@
           <a:p>
             <a:fld id="{62A8A12F-4B01-424F-AD07-F42ED760B84B}" type="datetimeFigureOut">
               <a:rPr lang="en-US" smtClean="0"/>
-              <a:t>2/10/2021</a:t>
+              <a:t>2/12/2021</a:t>
             </a:fld>
             <a:endParaRPr lang="en-US"/>
           </a:p>
@@ -2389,7 +2389,7 @@
           <a:p>
             <a:fld id="{62A8A12F-4B01-424F-AD07-F42ED760B84B}" type="datetimeFigureOut">
               <a:rPr lang="en-US" smtClean="0"/>
-              <a:t>2/10/2021</a:t>
+              <a:t>2/12/2021</a:t>
             </a:fld>
             <a:endParaRPr lang="en-US"/>
           </a:p>
@@ -2677,7 +2677,7 @@
           <a:p>
             <a:fld id="{62A8A12F-4B01-424F-AD07-F42ED760B84B}" type="datetimeFigureOut">
               <a:rPr lang="en-US" smtClean="0"/>
-              <a:t>2/10/2021</a:t>
+              <a:t>2/12/2021</a:t>
             </a:fld>
             <a:endParaRPr lang="en-US"/>
           </a:p>
@@ -2918,7 +2918,7 @@
           <a:p>
             <a:fld id="{62A8A12F-4B01-424F-AD07-F42ED760B84B}" type="datetimeFigureOut">
               <a:rPr lang="en-US" smtClean="0"/>
-              <a:t>2/10/2021</a:t>
+              <a:t>2/12/2021</a:t>
             </a:fld>
             <a:endParaRPr lang="en-US"/>
           </a:p>
@@ -4667,8 +4667,13 @@
             </a:r>
             <a:r>
               <a:rPr lang="en-US" dirty="0"/>
-              <a:t> – Session #2</a:t>
-            </a:r>
+              <a:t> – Session #2 – </a:t>
+            </a:r>
+            <a:r>
+              <a:rPr lang="en-US" dirty="0" err="1"/>
+              <a:t>TextFinder</a:t>
+            </a:r>
+            <a:endParaRPr lang="en-US" dirty="0"/>
           </a:p>
         </p:txBody>
       </p:sp>
@@ -4960,8 +4965,13 @@
             </a:r>
             <a:r>
               <a:rPr lang="en-US" dirty="0"/>
-              <a:t> – Session #3</a:t>
-            </a:r>
+              <a:t> – Session #3 – </a:t>
+            </a:r>
+            <a:r>
+              <a:rPr lang="en-US" dirty="0" err="1"/>
+              <a:t>DirNav</a:t>
+            </a:r>
+            <a:endParaRPr lang="en-US" dirty="0"/>
           </a:p>
         </p:txBody>
       </p:sp>

</xml_diff>